<commit_message>
add ios & android picture
</commit_message>
<xml_diff>
--- a/Google Calendar.pptx
+++ b/Google Calendar.pptx
@@ -589,7 +589,7 @@
             <a:fld id="{EEB31411-81DA-416F-953C-825CF1EE9A76}" type="datetimeFigureOut">
               <a:rPr lang="en-US" smtClean="0"/>
               <a:pPr/>
-              <a:t>4/4/2014</a:t>
+              <a:t>4/8/2014</a:t>
             </a:fld>
             <a:endParaRPr lang="en-US"/>
           </a:p>
@@ -800,7 +800,7 @@
             <a:fld id="{EEB31411-81DA-416F-953C-825CF1EE9A76}" type="datetimeFigureOut">
               <a:rPr lang="en-US" smtClean="0"/>
               <a:pPr/>
-              <a:t>4/4/2014</a:t>
+              <a:t>4/8/2014</a:t>
             </a:fld>
             <a:endParaRPr lang="en-US"/>
           </a:p>
@@ -1001,7 +1001,7 @@
             <a:fld id="{EEB31411-81DA-416F-953C-825CF1EE9A76}" type="datetimeFigureOut">
               <a:rPr lang="en-US" smtClean="0"/>
               <a:pPr/>
-              <a:t>4/4/2014</a:t>
+              <a:t>4/8/2014</a:t>
             </a:fld>
             <a:endParaRPr lang="en-US"/>
           </a:p>
@@ -2510,7 +2510,7 @@
             <a:fld id="{EEB31411-81DA-416F-953C-825CF1EE9A76}" type="datetimeFigureOut">
               <a:rPr lang="en-US" smtClean="0"/>
               <a:pPr/>
-              <a:t>4/4/2014</a:t>
+              <a:t>4/8/2014</a:t>
             </a:fld>
             <a:endParaRPr lang="en-US"/>
           </a:p>
@@ -3136,7 +3136,7 @@
             <a:fld id="{EEB31411-81DA-416F-953C-825CF1EE9A76}" type="datetimeFigureOut">
               <a:rPr lang="en-US" smtClean="0"/>
               <a:pPr/>
-              <a:t>4/4/2014</a:t>
+              <a:t>4/8/2014</a:t>
             </a:fld>
             <a:endParaRPr lang="en-US"/>
           </a:p>
@@ -3599,7 +3599,7 @@
             <a:fld id="{EEB31411-81DA-416F-953C-825CF1EE9A76}" type="datetimeFigureOut">
               <a:rPr lang="en-US" smtClean="0"/>
               <a:pPr/>
-              <a:t>4/4/2014</a:t>
+              <a:t>4/8/2014</a:t>
             </a:fld>
             <a:endParaRPr lang="en-US"/>
           </a:p>
@@ -4186,7 +4186,7 @@
             <a:fld id="{EEB31411-81DA-416F-953C-825CF1EE9A76}" type="datetimeFigureOut">
               <a:rPr lang="en-US" smtClean="0"/>
               <a:pPr/>
-              <a:t>4/4/2014</a:t>
+              <a:t>4/8/2014</a:t>
             </a:fld>
             <a:endParaRPr lang="en-US"/>
           </a:p>
@@ -4308,7 +4308,7 @@
             <a:fld id="{EEB31411-81DA-416F-953C-825CF1EE9A76}" type="datetimeFigureOut">
               <a:rPr lang="en-US" smtClean="0"/>
               <a:pPr/>
-              <a:t>4/4/2014</a:t>
+              <a:t>4/8/2014</a:t>
             </a:fld>
             <a:endParaRPr lang="en-US"/>
           </a:p>
@@ -4588,7 +4588,7 @@
             <a:fld id="{EEB31411-81DA-416F-953C-825CF1EE9A76}" type="datetimeFigureOut">
               <a:rPr lang="en-US" smtClean="0"/>
               <a:pPr/>
-              <a:t>4/4/2014</a:t>
+              <a:t>4/8/2014</a:t>
             </a:fld>
             <a:endParaRPr lang="en-US"/>
           </a:p>
@@ -5330,7 +5330,7 @@
             <a:fld id="{EEB31411-81DA-416F-953C-825CF1EE9A76}" type="datetimeFigureOut">
               <a:rPr lang="en-US" smtClean="0"/>
               <a:pPr/>
-              <a:t>4/4/2014</a:t>
+              <a:t>4/8/2014</a:t>
             </a:fld>
             <a:endParaRPr lang="en-US"/>
           </a:p>
@@ -7268,21 +7268,13 @@
           <a:p>
             <a:r>
               <a:rPr lang="th-TH" sz="4400" b="1" dirty="0" smtClean="0"/>
-              <a:t>การจัดการ</a:t>
-            </a:r>
+              <a:t>การจัดการกิจกรรม</a:t>
+            </a:r>
+          </a:p>
+          <a:p>
             <a:r>
               <a:rPr lang="th-TH" sz="4400" b="1" dirty="0" smtClean="0"/>
-              <a:t>กิจกรรม</a:t>
-            </a:r>
-          </a:p>
-          <a:p>
-            <a:r>
-              <a:rPr lang="th-TH" sz="4400" b="1" dirty="0" smtClean="0"/>
-              <a:t>การจัดการ</a:t>
-            </a:r>
-            <a:r>
-              <a:rPr lang="th-TH" sz="4400" b="1" dirty="0" smtClean="0"/>
-              <a:t>ปฏิทิน</a:t>
+              <a:t>การจัดการปฏิทิน</a:t>
             </a:r>
           </a:p>
           <a:p>

</xml_diff>